<commit_message>
input validation and disable past date
</commit_message>
<xml_diff>
--- a/documents/Presentation1.pptx
+++ b/documents/Presentation1.pptx
@@ -259,7 +259,7 @@
           <a:p>
             <a:fld id="{FA6018A8-208B-44B5-87E8-58C4F911026C}" type="datetimeFigureOut">
               <a:rPr lang="en-US" smtClean="0"/>
-              <a:t>8/15/2022</a:t>
+              <a:t>8/16/2022</a:t>
             </a:fld>
             <a:endParaRPr lang="en-US"/>
           </a:p>
@@ -457,7 +457,7 @@
           <a:p>
             <a:fld id="{FA6018A8-208B-44B5-87E8-58C4F911026C}" type="datetimeFigureOut">
               <a:rPr lang="en-US" smtClean="0"/>
-              <a:t>8/15/2022</a:t>
+              <a:t>8/16/2022</a:t>
             </a:fld>
             <a:endParaRPr lang="en-US"/>
           </a:p>
@@ -665,7 +665,7 @@
           <a:p>
             <a:fld id="{FA6018A8-208B-44B5-87E8-58C4F911026C}" type="datetimeFigureOut">
               <a:rPr lang="en-US" smtClean="0"/>
-              <a:t>8/15/2022</a:t>
+              <a:t>8/16/2022</a:t>
             </a:fld>
             <a:endParaRPr lang="en-US"/>
           </a:p>
@@ -863,7 +863,7 @@
           <a:p>
             <a:fld id="{FA6018A8-208B-44B5-87E8-58C4F911026C}" type="datetimeFigureOut">
               <a:rPr lang="en-US" smtClean="0"/>
-              <a:t>8/15/2022</a:t>
+              <a:t>8/16/2022</a:t>
             </a:fld>
             <a:endParaRPr lang="en-US"/>
           </a:p>
@@ -1138,7 +1138,7 @@
           <a:p>
             <a:fld id="{FA6018A8-208B-44B5-87E8-58C4F911026C}" type="datetimeFigureOut">
               <a:rPr lang="en-US" smtClean="0"/>
-              <a:t>8/15/2022</a:t>
+              <a:t>8/16/2022</a:t>
             </a:fld>
             <a:endParaRPr lang="en-US"/>
           </a:p>
@@ -1403,7 +1403,7 @@
           <a:p>
             <a:fld id="{FA6018A8-208B-44B5-87E8-58C4F911026C}" type="datetimeFigureOut">
               <a:rPr lang="en-US" smtClean="0"/>
-              <a:t>8/15/2022</a:t>
+              <a:t>8/16/2022</a:t>
             </a:fld>
             <a:endParaRPr lang="en-US"/>
           </a:p>
@@ -1815,7 +1815,7 @@
           <a:p>
             <a:fld id="{FA6018A8-208B-44B5-87E8-58C4F911026C}" type="datetimeFigureOut">
               <a:rPr lang="en-US" smtClean="0"/>
-              <a:t>8/15/2022</a:t>
+              <a:t>8/16/2022</a:t>
             </a:fld>
             <a:endParaRPr lang="en-US"/>
           </a:p>
@@ -1956,7 +1956,7 @@
           <a:p>
             <a:fld id="{FA6018A8-208B-44B5-87E8-58C4F911026C}" type="datetimeFigureOut">
               <a:rPr lang="en-US" smtClean="0"/>
-              <a:t>8/15/2022</a:t>
+              <a:t>8/16/2022</a:t>
             </a:fld>
             <a:endParaRPr lang="en-US"/>
           </a:p>
@@ -2069,7 +2069,7 @@
           <a:p>
             <a:fld id="{FA6018A8-208B-44B5-87E8-58C4F911026C}" type="datetimeFigureOut">
               <a:rPr lang="en-US" smtClean="0"/>
-              <a:t>8/15/2022</a:t>
+              <a:t>8/16/2022</a:t>
             </a:fld>
             <a:endParaRPr lang="en-US"/>
           </a:p>
@@ -2380,7 +2380,7 @@
           <a:p>
             <a:fld id="{FA6018A8-208B-44B5-87E8-58C4F911026C}" type="datetimeFigureOut">
               <a:rPr lang="en-US" smtClean="0"/>
-              <a:t>8/15/2022</a:t>
+              <a:t>8/16/2022</a:t>
             </a:fld>
             <a:endParaRPr lang="en-US"/>
           </a:p>
@@ -2668,7 +2668,7 @@
           <a:p>
             <a:fld id="{FA6018A8-208B-44B5-87E8-58C4F911026C}" type="datetimeFigureOut">
               <a:rPr lang="en-US" smtClean="0"/>
-              <a:t>8/15/2022</a:t>
+              <a:t>8/16/2022</a:t>
             </a:fld>
             <a:endParaRPr lang="en-US"/>
           </a:p>
@@ -2909,7 +2909,7 @@
           <a:p>
             <a:fld id="{FA6018A8-208B-44B5-87E8-58C4F911026C}" type="datetimeFigureOut">
               <a:rPr lang="en-US" smtClean="0"/>
-              <a:t>8/15/2022</a:t>
+              <a:t>8/16/2022</a:t>
             </a:fld>
             <a:endParaRPr lang="en-US"/>
           </a:p>
@@ -3525,7 +3525,7 @@
         </p:nvGrpSpPr>
         <p:grpSpPr>
           <a:xfrm>
-            <a:off x="1757240" y="4683335"/>
+            <a:off x="8465302" y="2148396"/>
             <a:ext cx="1650319" cy="1166483"/>
             <a:chOff x="523323" y="309043"/>
             <a:chExt cx="1650319" cy="1166483"/>
@@ -3938,101 +3938,45 @@
             </a:p>
           </p:txBody>
         </p:sp>
-        <p:grpSp>
-          <p:nvGrpSpPr>
-            <p:cNvPr id="69" name="Group 68">
+        <p:sp>
+          <p:nvSpPr>
+            <p:cNvPr id="70" name="TextBox 69">
               <a:extLst>
                 <a:ext uri="{FF2B5EF4-FFF2-40B4-BE49-F238E27FC236}">
-                  <a16:creationId xmlns:a16="http://schemas.microsoft.com/office/drawing/2014/main" id="{3C3E0296-DC2E-66E7-F009-011F8919C399}"/>
+                  <a16:creationId xmlns:a16="http://schemas.microsoft.com/office/drawing/2014/main" id="{FEDF592C-46DA-2743-99EB-5460DDF8667A}"/>
                 </a:ext>
               </a:extLst>
             </p:cNvPr>
-            <p:cNvGrpSpPr/>
+            <p:cNvSpPr txBox="1"/>
             <p:nvPr/>
-          </p:nvGrpSpPr>
-          <p:grpSpPr>
+          </p:nvSpPr>
+          <p:spPr>
             <a:xfrm>
-              <a:off x="885053" y="479806"/>
-              <a:ext cx="926857" cy="716141"/>
-              <a:chOff x="885053" y="479624"/>
-              <a:chExt cx="926857" cy="716141"/>
+              <a:off x="1071072" y="740543"/>
+              <a:ext cx="639919" cy="303481"/>
             </a:xfrm>
-          </p:grpSpPr>
-          <p:sp>
-            <p:nvSpPr>
-              <p:cNvPr id="70" name="TextBox 69">
-                <a:extLst>
-                  <a:ext uri="{FF2B5EF4-FFF2-40B4-BE49-F238E27FC236}">
-                    <a16:creationId xmlns:a16="http://schemas.microsoft.com/office/drawing/2014/main" id="{FEDF592C-46DA-2743-99EB-5460DDF8667A}"/>
-                  </a:ext>
-                </a:extLst>
-              </p:cNvPr>
-              <p:cNvSpPr txBox="1"/>
-              <p:nvPr/>
-            </p:nvSpPr>
-            <p:spPr>
-              <a:xfrm>
-                <a:off x="1009380" y="479624"/>
-                <a:ext cx="639919" cy="303481"/>
-              </a:xfrm>
-              <a:prstGeom prst="rect">
-                <a:avLst/>
-              </a:prstGeom>
-              <a:noFill/>
-            </p:spPr>
-            <p:txBody>
-              <a:bodyPr wrap="none" rtlCol="0">
-                <a:spAutoFit/>
-              </a:bodyPr>
-              <a:lstStyle/>
-              <a:p>
-                <a:r>
-                  <a:rPr lang="en-US" sz="1372" b="1" i="1" dirty="0">
-                    <a:solidFill>
-                      <a:srgbClr val="FF0000"/>
-                    </a:solidFill>
-                  </a:rPr>
-                  <a:t>&lt;app&gt;</a:t>
-                </a:r>
-              </a:p>
-            </p:txBody>
-          </p:sp>
-          <p:sp>
-            <p:nvSpPr>
-              <p:cNvPr id="71" name="TextBox 70">
-                <a:extLst>
-                  <a:ext uri="{FF2B5EF4-FFF2-40B4-BE49-F238E27FC236}">
-                    <a16:creationId xmlns:a16="http://schemas.microsoft.com/office/drawing/2014/main" id="{9B62C5AE-BAAB-3FBB-2BB2-047D49B30CDF}"/>
-                  </a:ext>
-                </a:extLst>
-              </p:cNvPr>
-              <p:cNvSpPr txBox="1"/>
-              <p:nvPr/>
-            </p:nvSpPr>
-            <p:spPr>
-              <a:xfrm>
-                <a:off x="885053" y="892284"/>
-                <a:ext cx="926857" cy="303481"/>
-              </a:xfrm>
-              <a:prstGeom prst="rect">
-                <a:avLst/>
-              </a:prstGeom>
-              <a:noFill/>
-            </p:spPr>
-            <p:txBody>
-              <a:bodyPr wrap="none" rtlCol="0">
-                <a:spAutoFit/>
-              </a:bodyPr>
-              <a:lstStyle/>
-              <a:p>
-                <a:r>
-                  <a:rPr lang="en-US" sz="1372" dirty="0"/>
-                  <a:t>Students[]</a:t>
-                </a:r>
-              </a:p>
-            </p:txBody>
-          </p:sp>
-        </p:grpSp>
+            <a:prstGeom prst="rect">
+              <a:avLst/>
+            </a:prstGeom>
+            <a:noFill/>
+          </p:spPr>
+          <p:txBody>
+            <a:bodyPr wrap="none" rtlCol="0">
+              <a:spAutoFit/>
+            </a:bodyPr>
+            <a:lstStyle/>
+            <a:p>
+              <a:r>
+                <a:rPr lang="en-US" sz="1372" b="1" i="1" dirty="0">
+                  <a:solidFill>
+                    <a:srgbClr val="FF0000"/>
+                  </a:solidFill>
+                </a:rPr>
+                <a:t>&lt;app&gt;</a:t>
+              </a:r>
+            </a:p>
+          </p:txBody>
+        </p:sp>
       </p:grpSp>
       <p:grpSp>
         <p:nvGrpSpPr>
@@ -4203,45 +4147,6 @@
           </p:sp>
         </p:grpSp>
       </p:grpSp>
-      <p:sp>
-        <p:nvSpPr>
-          <p:cNvPr id="87" name="TextBox 86">
-            <a:extLst>
-              <a:ext uri="{FF2B5EF4-FFF2-40B4-BE49-F238E27FC236}">
-                <a16:creationId xmlns:a16="http://schemas.microsoft.com/office/drawing/2014/main" id="{92B68C95-99DE-F9A4-918E-75235DF7BA53}"/>
-              </a:ext>
-            </a:extLst>
-          </p:cNvPr>
-          <p:cNvSpPr txBox="1"/>
-          <p:nvPr/>
-        </p:nvSpPr>
-        <p:spPr>
-          <a:xfrm>
-            <a:off x="3743150" y="3786541"/>
-            <a:ext cx="894860" cy="369332"/>
-          </a:xfrm>
-          <a:prstGeom prst="rect">
-            <a:avLst/>
-          </a:prstGeom>
-          <a:noFill/>
-        </p:spPr>
-        <p:txBody>
-          <a:bodyPr wrap="none" rtlCol="0">
-            <a:spAutoFit/>
-          </a:bodyPr>
-          <a:lstStyle/>
-          <a:p>
-            <a:r>
-              <a:rPr lang="en-US" dirty="0">
-                <a:solidFill>
-                  <a:srgbClr val="7030A0"/>
-                </a:solidFill>
-              </a:rPr>
-              <a:t>Provide</a:t>
-            </a:r>
-          </a:p>
-        </p:txBody>
-      </p:sp>
       <p:cxnSp>
         <p:nvCxnSpPr>
           <p:cNvPr id="91" name="Straight Arrow Connector 90">
@@ -4416,8 +4321,8 @@
         </p:nvSpPr>
         <p:spPr>
           <a:xfrm>
-            <a:off x="3638098" y="1312450"/>
-            <a:ext cx="894860" cy="369332"/>
+            <a:off x="7480831" y="1453424"/>
+            <a:ext cx="611065" cy="369332"/>
           </a:xfrm>
           <a:prstGeom prst="rect">
             <a:avLst/>
@@ -4436,29 +4341,27 @@
                   <a:srgbClr val="7030A0"/>
                 </a:solidFill>
               </a:rPr>
-              <a:t>Provide</a:t>
+              <a:t>Emit</a:t>
             </a:r>
           </a:p>
         </p:txBody>
       </p:sp>
       <p:cxnSp>
         <p:nvCxnSpPr>
-          <p:cNvPr id="3" name="Straight Arrow Connector 2">
-            <a:extLst>
-              <a:ext uri="{FF2B5EF4-FFF2-40B4-BE49-F238E27FC236}">
-                <a16:creationId xmlns:a16="http://schemas.microsoft.com/office/drawing/2014/main" id="{8CFE0D96-3ED7-C996-3A37-FB879B7FE313}"/>
-              </a:ext>
-            </a:extLst>
-          </p:cNvPr>
-          <p:cNvCxnSpPr>
-            <a:cxnSpLocks/>
-          </p:cNvCxnSpPr>
+          <p:cNvPr id="4" name="Straight Arrow Connector 3">
+            <a:extLst>
+              <a:ext uri="{FF2B5EF4-FFF2-40B4-BE49-F238E27FC236}">
+                <a16:creationId xmlns:a16="http://schemas.microsoft.com/office/drawing/2014/main" id="{51CE6338-7B5E-878F-13E2-80F3A899905F}"/>
+              </a:ext>
+            </a:extLst>
+          </p:cNvPr>
+          <p:cNvCxnSpPr/>
           <p:nvPr/>
         </p:nvCxnSpPr>
         <p:spPr>
-          <a:xfrm flipV="1">
-            <a:off x="2599484" y="3443253"/>
-            <a:ext cx="0" cy="1164421"/>
+          <a:xfrm flipH="1" flipV="1">
+            <a:off x="6874544" y="1402672"/>
+            <a:ext cx="1590758" cy="916487"/>
           </a:xfrm>
           <a:prstGeom prst="straightConnector1">
             <a:avLst/>
@@ -4482,12 +4385,51 @@
           </a:fontRef>
         </p:style>
       </p:cxnSp>
-      <p:sp>
-        <p:nvSpPr>
-          <p:cNvPr id="5" name="TextBox 4">
-            <a:extLst>
-              <a:ext uri="{FF2B5EF4-FFF2-40B4-BE49-F238E27FC236}">
-                <a16:creationId xmlns:a16="http://schemas.microsoft.com/office/drawing/2014/main" id="{819FC025-E974-A34C-715B-FC1A2BAEBE49}"/>
+      <p:cxnSp>
+        <p:nvCxnSpPr>
+          <p:cNvPr id="7" name="Straight Arrow Connector 6">
+            <a:extLst>
+              <a:ext uri="{FF2B5EF4-FFF2-40B4-BE49-F238E27FC236}">
+                <a16:creationId xmlns:a16="http://schemas.microsoft.com/office/drawing/2014/main" id="{61B706E7-531E-4A50-D88C-B7E117C89210}"/>
+              </a:ext>
+            </a:extLst>
+          </p:cNvPr>
+          <p:cNvCxnSpPr/>
+          <p:nvPr/>
+        </p:nvCxnSpPr>
+        <p:spPr>
+          <a:xfrm flipH="1">
+            <a:off x="6921159" y="3130156"/>
+            <a:ext cx="1433813" cy="1020081"/>
+          </a:xfrm>
+          <a:prstGeom prst="straightConnector1">
+            <a:avLst/>
+          </a:prstGeom>
+          <a:ln>
+            <a:tailEnd type="triangle"/>
+          </a:ln>
+        </p:spPr>
+        <p:style>
+          <a:lnRef idx="3">
+            <a:schemeClr val="accent2"/>
+          </a:lnRef>
+          <a:fillRef idx="0">
+            <a:schemeClr val="accent2"/>
+          </a:fillRef>
+          <a:effectRef idx="2">
+            <a:schemeClr val="accent2"/>
+          </a:effectRef>
+          <a:fontRef idx="minor">
+            <a:schemeClr val="tx1"/>
+          </a:fontRef>
+        </p:style>
+      </p:cxnSp>
+      <p:sp>
+        <p:nvSpPr>
+          <p:cNvPr id="8" name="TextBox 7">
+            <a:extLst>
+              <a:ext uri="{FF2B5EF4-FFF2-40B4-BE49-F238E27FC236}">
+                <a16:creationId xmlns:a16="http://schemas.microsoft.com/office/drawing/2014/main" id="{E2BE53E4-235F-EE45-E895-06D08FDA00C4}"/>
               </a:ext>
             </a:extLst>
           </p:cNvPr>
@@ -4496,7 +4438,7 @@
         </p:nvSpPr>
         <p:spPr>
           <a:xfrm>
-            <a:off x="1652690" y="3881917"/>
+            <a:off x="7559613" y="3581506"/>
             <a:ext cx="611065" cy="369332"/>
           </a:xfrm>
           <a:prstGeom prst="rect">

</xml_diff>